<commit_message>
Hello Patient Tutorial - Navigation added
</commit_message>
<xml_diff>
--- a/public/Fhir_resource_Examples.pptx
+++ b/public/Fhir_resource_Examples.pptx
@@ -5163,6 +5163,96 @@
               <a:t>JSON</a:t>
             </a:r>
             <a:endParaRPr lang="en-US" dirty="0"/>
+          </a:p>
+        </p:txBody>
+      </p:sp>
+      <p:sp>
+        <p:nvSpPr>
+          <p:cNvPr id="19" name="TextBox 18"/>
+          <p:cNvSpPr txBox="1"/>
+          <p:nvPr/>
+        </p:nvSpPr>
+        <p:spPr>
+          <a:xfrm>
+            <a:off x="6168305" y="2106209"/>
+            <a:ext cx="2520917" cy="307777"/>
+          </a:xfrm>
+          <a:prstGeom prst="rect">
+            <a:avLst/>
+          </a:prstGeom>
+          <a:noFill/>
+        </p:spPr>
+        <p:txBody>
+          <a:bodyPr wrap="none" rtlCol="0">
+            <a:spAutoFit/>
+          </a:bodyPr>
+          <a:lstStyle/>
+          <a:p>
+            <a:r>
+              <a:rPr lang="en-US" sz="1400" dirty="0" smtClean="0"/>
+              <a:t>Resource identity and metadata</a:t>
+            </a:r>
+            <a:endParaRPr lang="en-US" sz="1400" dirty="0"/>
+          </a:p>
+        </p:txBody>
+      </p:sp>
+      <p:sp>
+        <p:nvSpPr>
+          <p:cNvPr id="20" name="TextBox 19"/>
+          <p:cNvSpPr txBox="1"/>
+          <p:nvPr/>
+        </p:nvSpPr>
+        <p:spPr>
+          <a:xfrm>
+            <a:off x="6168305" y="2913349"/>
+            <a:ext cx="2121093" cy="307777"/>
+          </a:xfrm>
+          <a:prstGeom prst="rect">
+            <a:avLst/>
+          </a:prstGeom>
+          <a:noFill/>
+        </p:spPr>
+        <p:txBody>
+          <a:bodyPr wrap="none" rtlCol="0">
+            <a:spAutoFit/>
+          </a:bodyPr>
+          <a:lstStyle/>
+          <a:p>
+            <a:r>
+              <a:rPr lang="en-US" sz="1400" dirty="0" smtClean="0"/>
+              <a:t>Human readable summary</a:t>
+            </a:r>
+            <a:endParaRPr lang="en-US" sz="1400" dirty="0"/>
+          </a:p>
+        </p:txBody>
+      </p:sp>
+      <p:sp>
+        <p:nvSpPr>
+          <p:cNvPr id="21" name="TextBox 20"/>
+          <p:cNvSpPr txBox="1"/>
+          <p:nvPr/>
+        </p:nvSpPr>
+        <p:spPr>
+          <a:xfrm>
+            <a:off x="6168305" y="4191273"/>
+            <a:ext cx="1656811" cy="307777"/>
+          </a:xfrm>
+          <a:prstGeom prst="rect">
+            <a:avLst/>
+          </a:prstGeom>
+          <a:noFill/>
+        </p:spPr>
+        <p:txBody>
+          <a:bodyPr wrap="none" rtlCol="0">
+            <a:spAutoFit/>
+          </a:bodyPr>
+          <a:lstStyle/>
+          <a:p>
+            <a:r>
+              <a:rPr lang="en-US" sz="1400" dirty="0" smtClean="0"/>
+              <a:t>Standard data items</a:t>
+            </a:r>
+            <a:endParaRPr lang="en-US" sz="1400" dirty="0"/>
           </a:p>
         </p:txBody>
       </p:sp>

</xml_diff>